<commit_message>
revised stuff for today
</commit_message>
<xml_diff>
--- a/Wi18_content/DSMCER/L12.Decision_Trees.pptx
+++ b/Wi18_content/DSMCER/L12.Decision_Trees.pptx
@@ -6,7 +6,7 @@
     <p:sldMasterId id="2147483652" r:id="rId2"/>
   </p:sldMasterIdLst>
   <p:notesMasterIdLst>
-    <p:notesMasterId r:id="rId18"/>
+    <p:notesMasterId r:id="rId19"/>
   </p:notesMasterIdLst>
   <p:sldIdLst>
     <p:sldId id="276" r:id="rId3"/>
@@ -18,12 +18,13 @@
     <p:sldId id="399" r:id="rId9"/>
     <p:sldId id="391" r:id="rId10"/>
     <p:sldId id="393" r:id="rId11"/>
-    <p:sldId id="394" r:id="rId12"/>
-    <p:sldId id="395" r:id="rId13"/>
-    <p:sldId id="396" r:id="rId14"/>
-    <p:sldId id="397" r:id="rId15"/>
-    <p:sldId id="401" r:id="rId16"/>
-    <p:sldId id="402" r:id="rId17"/>
+    <p:sldId id="403" r:id="rId12"/>
+    <p:sldId id="394" r:id="rId13"/>
+    <p:sldId id="395" r:id="rId14"/>
+    <p:sldId id="396" r:id="rId15"/>
+    <p:sldId id="397" r:id="rId16"/>
+    <p:sldId id="401" r:id="rId17"/>
+    <p:sldId id="402" r:id="rId18"/>
   </p:sldIdLst>
   <p:sldSz cx="9144000" cy="6858000" type="screen4x3"/>
   <p:notesSz cx="6858000" cy="9144000"/>
@@ -226,7 +227,7 @@
           <a:p>
             <a:fld id="{BBEA69A4-43A8-4442-8088-0B845332DB30}" type="datetimeFigureOut">
               <a:rPr lang="en-US" smtClean="0"/>
-              <a:t>2/25/17</a:t>
+              <a:t>2/27/18</a:t>
             </a:fld>
             <a:endParaRPr lang="en-US"/>
           </a:p>
@@ -3405,55 +3406,6 @@
           </a:p>
         </p:txBody>
       </p:sp>
-      <p:sp>
-        <p:nvSpPr>
-          <p:cNvPr id="3" name="TextBox 2"/>
-          <p:cNvSpPr txBox="1"/>
-          <p:nvPr/>
-        </p:nvSpPr>
-        <p:spPr>
-          <a:xfrm>
-            <a:off x="671757" y="4588566"/>
-            <a:ext cx="4792824" cy="923330"/>
-          </a:xfrm>
-          <a:prstGeom prst="rect">
-            <a:avLst/>
-          </a:prstGeom>
-          <a:noFill/>
-        </p:spPr>
-        <p:txBody>
-          <a:bodyPr wrap="square" rtlCol="0">
-            <a:spAutoFit/>
-          </a:bodyPr>
-          <a:lstStyle/>
-          <a:p>
-            <a:r>
-              <a:rPr lang="en-US" dirty="0" smtClean="0"/>
-              <a:t>Week 9 L1: Decision Trees</a:t>
-            </a:r>
-          </a:p>
-          <a:p>
-            <a:endParaRPr lang="en-US" dirty="0"/>
-          </a:p>
-          <a:p>
-            <a:r>
-              <a:rPr lang="en-US" strike="sngStrike" dirty="0" smtClean="0"/>
-              <a:t>Feb 26, 2017 </a:t>
-            </a:r>
-            <a:r>
-              <a:rPr lang="en-US" strike="sngStrike" dirty="0" smtClean="0"/>
-              <a:t> </a:t>
-            </a:r>
-            <a:r>
-              <a:rPr lang="en-US" dirty="0" smtClean="0">
-                <a:sym typeface="Wingdings"/>
-              </a:rPr>
-              <a:t> March 1 2017</a:t>
-            </a:r>
-            <a:endParaRPr lang="en-US" dirty="0"/>
-          </a:p>
-        </p:txBody>
-      </p:sp>
     </p:spTree>
     <p:extLst>
       <p:ext uri="{BB962C8B-B14F-4D97-AF65-F5344CB8AC3E}">
@@ -3508,7 +3460,7 @@
           <a:p>
             <a:r>
               <a:rPr lang="en-US" dirty="0" smtClean="0"/>
-              <a:t>In class Python project: Teams of 2</a:t>
+              <a:t>Big picture concepts in building a tree</a:t>
             </a:r>
             <a:endParaRPr lang="en-US" dirty="0"/>
           </a:p>
@@ -3524,336 +3476,41 @@
             <p:ph type="body" sz="quarter" idx="11"/>
           </p:nvPr>
         </p:nvSpPr>
-        <p:spPr>
-          <a:xfrm>
-            <a:off x="671757" y="1539015"/>
-            <a:ext cx="4141295" cy="4932432"/>
-          </a:xfrm>
-        </p:spPr>
+        <p:spPr/>
         <p:txBody>
           <a:bodyPr/>
           <a:lstStyle/>
           <a:p>
             <a:r>
-              <a:rPr lang="en-US" sz="1600" dirty="0" smtClean="0"/>
-              <a:t>You should use the UCI data set and look to predict the Y1 (heating load) response vs all 8 predictors (X1-X8) </a:t>
-            </a:r>
-          </a:p>
-          <a:p>
-            <a:pPr lvl="1"/>
-            <a:r>
-              <a:rPr lang="en-US" sz="1400" dirty="0" smtClean="0"/>
-              <a:t>Break the data into 80% (training), 20% (testing) </a:t>
-            </a:r>
-          </a:p>
-          <a:p>
-            <a:r>
-              <a:rPr lang="en-US" sz="1600" dirty="0" smtClean="0"/>
-              <a:t>Use a Python package that can perform decision tree regression </a:t>
-            </a:r>
-          </a:p>
-          <a:p>
-            <a:r>
-              <a:rPr lang="en-US" sz="1600" dirty="0" smtClean="0"/>
-              <a:t>Make a plot of testing/training error vs. max tree depth (</a:t>
-            </a:r>
-            <a:r>
-              <a:rPr lang="en-US" sz="1600" b="0" dirty="0" smtClean="0"/>
-              <a:t>discuss what you expect the graph to look like</a:t>
-            </a:r>
-            <a:r>
-              <a:rPr lang="en-US" sz="1600" dirty="0" smtClean="0"/>
-              <a:t> </a:t>
-            </a:r>
-            <a:r>
-              <a:rPr lang="en-US" sz="1600" b="0" dirty="0" smtClean="0"/>
-              <a:t>first!</a:t>
-            </a:r>
-            <a:r>
-              <a:rPr lang="en-US" sz="1600" dirty="0"/>
-              <a:t> </a:t>
-            </a:r>
-            <a:r>
-              <a:rPr lang="en-US" sz="1600" b="0" dirty="0" smtClean="0"/>
-              <a:t>Really.  Draw a sketch!</a:t>
-            </a:r>
-            <a:r>
-              <a:rPr lang="en-US" sz="1600" dirty="0" smtClean="0"/>
-              <a:t>) </a:t>
-            </a:r>
-          </a:p>
-          <a:p>
-            <a:pPr lvl="1"/>
-            <a:r>
-              <a:rPr lang="en-US" sz="1400" dirty="0" smtClean="0"/>
-              <a:t>Don’t worry about differentiating validation vs test set data</a:t>
-            </a:r>
-          </a:p>
-          <a:p>
-            <a:pPr lvl="1"/>
-            <a:r>
-              <a:rPr lang="en-US" sz="1400" dirty="0" smtClean="0"/>
-              <a:t>You can hijack a lot of the code from last Wed </a:t>
-            </a:r>
-          </a:p>
-          <a:p>
-            <a:r>
-              <a:rPr lang="en-US" sz="1600" dirty="0" smtClean="0"/>
-              <a:t>We will do 2 min </a:t>
-            </a:r>
-            <a:r>
-              <a:rPr lang="en-US" sz="1600" b="0" dirty="0" smtClean="0"/>
-              <a:t>standups</a:t>
-            </a:r>
-            <a:r>
-              <a:rPr lang="en-US" sz="1600" dirty="0" smtClean="0"/>
-              <a:t> every 10 mins and go for ~50 mins (</a:t>
-            </a:r>
-            <a:r>
-              <a:rPr lang="en-US" sz="1600" u="sng" dirty="0" smtClean="0"/>
-              <a:t>I will pick teams or ask for volunteer</a:t>
-            </a:r>
-            <a:r>
-              <a:rPr lang="en-US" sz="1600" dirty="0" smtClean="0"/>
-              <a:t>)</a:t>
-            </a:r>
-          </a:p>
-        </p:txBody>
-      </p:sp>
-      <p:sp>
-        <p:nvSpPr>
-          <p:cNvPr id="4" name="Text Placeholder 2"/>
-          <p:cNvSpPr txBox="1">
-            <a:spLocks/>
-          </p:cNvSpPr>
-          <p:nvPr/>
-        </p:nvSpPr>
-        <p:spPr>
-          <a:xfrm>
-            <a:off x="4562061" y="1539790"/>
-            <a:ext cx="4141295" cy="4932432"/>
-          </a:xfrm>
-          <a:prstGeom prst="rect">
-            <a:avLst/>
-          </a:prstGeom>
-        </p:spPr>
-        <p:txBody>
-          <a:bodyPr/>
-          <a:lstStyle>
-            <a:lvl1pPr marL="342900" indent="-342900" algn="l" defTabSz="457200" rtl="0" eaLnBrk="1" latinLnBrk="0" hangingPunct="1">
-              <a:spcBef>
-                <a:spcPct val="20000"/>
-              </a:spcBef>
-              <a:buFont typeface="Lucida Grande"/>
-              <a:buChar char="&gt;"/>
-              <a:defRPr sz="2400" b="1" i="0" kern="1200" baseline="0">
-                <a:solidFill>
-                  <a:srgbClr val="4B2E83"/>
-                </a:solidFill>
-                <a:latin typeface="Open Sans"/>
-                <a:ea typeface="+mn-ea"/>
-                <a:cs typeface="Open Sans"/>
-              </a:defRPr>
-            </a:lvl1pPr>
-            <a:lvl2pPr marL="742950" indent="-285750" algn="l" defTabSz="457200" rtl="0" eaLnBrk="1" latinLnBrk="0" hangingPunct="1">
-              <a:spcBef>
-                <a:spcPct val="20000"/>
-              </a:spcBef>
-              <a:buFont typeface="Arial"/>
-              <a:buChar char="–"/>
-              <a:defRPr sz="2000" b="1" i="0" kern="1200" baseline="0">
-                <a:solidFill>
-                  <a:srgbClr val="4B2E83"/>
-                </a:solidFill>
-                <a:latin typeface="Open Sans"/>
-                <a:ea typeface="+mn-ea"/>
-                <a:cs typeface="Open Sans"/>
-              </a:defRPr>
-            </a:lvl2pPr>
-            <a:lvl3pPr marL="1143000" indent="-228600" algn="l" defTabSz="457200" rtl="0" eaLnBrk="1" latinLnBrk="0" hangingPunct="1">
-              <a:spcBef>
-                <a:spcPct val="20000"/>
-              </a:spcBef>
-              <a:buSzPct val="100000"/>
-              <a:buFont typeface="Lucida Grande"/>
-              <a:buChar char="&gt;"/>
-              <a:defRPr sz="1800" b="1" i="0" kern="1200" baseline="0">
-                <a:solidFill>
-                  <a:srgbClr val="4B2E83"/>
-                </a:solidFill>
-                <a:latin typeface="Open Sans"/>
-                <a:ea typeface="+mn-ea"/>
-                <a:cs typeface="Open Sans"/>
-              </a:defRPr>
-            </a:lvl3pPr>
-            <a:lvl4pPr marL="1600200" indent="-228600" algn="l" defTabSz="457200" rtl="0" eaLnBrk="1" latinLnBrk="0" hangingPunct="1">
-              <a:spcBef>
-                <a:spcPct val="20000"/>
-              </a:spcBef>
-              <a:buFont typeface="Arial"/>
-              <a:buChar char="–"/>
-              <a:defRPr sz="1600" b="1" i="0" kern="1200" baseline="0">
-                <a:solidFill>
-                  <a:srgbClr val="4B2E83"/>
-                </a:solidFill>
-                <a:latin typeface="Open Sans"/>
-                <a:ea typeface="+mn-ea"/>
-                <a:cs typeface="Open Sans"/>
-              </a:defRPr>
-            </a:lvl4pPr>
-            <a:lvl5pPr marL="2057400" indent="-228600" algn="l" defTabSz="457200" rtl="0" eaLnBrk="1" latinLnBrk="0" hangingPunct="1">
-              <a:spcBef>
-                <a:spcPct val="20000"/>
-              </a:spcBef>
-              <a:buFont typeface="Lucida Grande"/>
-              <a:buChar char="&gt;"/>
-              <a:defRPr sz="1400" b="1" i="0" kern="1200" baseline="0">
-                <a:solidFill>
-                  <a:srgbClr val="4B2E83"/>
-                </a:solidFill>
-                <a:latin typeface="Open Sans"/>
-                <a:ea typeface="+mn-ea"/>
-                <a:cs typeface="Open Sans"/>
-              </a:defRPr>
-            </a:lvl5pPr>
-            <a:lvl6pPr marL="2514600" indent="-228600" algn="l" defTabSz="457200" rtl="0" eaLnBrk="1" latinLnBrk="0" hangingPunct="1">
-              <a:spcBef>
-                <a:spcPct val="20000"/>
-              </a:spcBef>
-              <a:buFont typeface="Arial"/>
-              <a:buChar char="•"/>
-              <a:defRPr sz="2000" kern="1200">
-                <a:solidFill>
-                  <a:schemeClr val="tx1"/>
-                </a:solidFill>
-                <a:latin typeface="+mn-lt"/>
-                <a:ea typeface="+mn-ea"/>
-                <a:cs typeface="+mn-cs"/>
-              </a:defRPr>
-            </a:lvl6pPr>
-            <a:lvl7pPr marL="2971800" indent="-228600" algn="l" defTabSz="457200" rtl="0" eaLnBrk="1" latinLnBrk="0" hangingPunct="1">
-              <a:spcBef>
-                <a:spcPct val="20000"/>
-              </a:spcBef>
-              <a:buFont typeface="Arial"/>
-              <a:buChar char="•"/>
-              <a:defRPr sz="2000" kern="1200">
-                <a:solidFill>
-                  <a:schemeClr val="tx1"/>
-                </a:solidFill>
-                <a:latin typeface="+mn-lt"/>
-                <a:ea typeface="+mn-ea"/>
-                <a:cs typeface="+mn-cs"/>
-              </a:defRPr>
-            </a:lvl7pPr>
-            <a:lvl8pPr marL="3429000" indent="-228600" algn="l" defTabSz="457200" rtl="0" eaLnBrk="1" latinLnBrk="0" hangingPunct="1">
-              <a:spcBef>
-                <a:spcPct val="20000"/>
-              </a:spcBef>
-              <a:buFont typeface="Arial"/>
-              <a:buChar char="•"/>
-              <a:defRPr sz="2000" kern="1200">
-                <a:solidFill>
-                  <a:schemeClr val="tx1"/>
-                </a:solidFill>
-                <a:latin typeface="+mn-lt"/>
-                <a:ea typeface="+mn-ea"/>
-                <a:cs typeface="+mn-cs"/>
-              </a:defRPr>
-            </a:lvl8pPr>
-            <a:lvl9pPr marL="3886200" indent="-228600" algn="l" defTabSz="457200" rtl="0" eaLnBrk="1" latinLnBrk="0" hangingPunct="1">
-              <a:spcBef>
-                <a:spcPct val="20000"/>
-              </a:spcBef>
-              <a:buFont typeface="Arial"/>
-              <a:buChar char="•"/>
-              <a:defRPr sz="2000" kern="1200">
-                <a:solidFill>
-                  <a:schemeClr val="tx1"/>
-                </a:solidFill>
-                <a:latin typeface="+mn-lt"/>
-                <a:ea typeface="+mn-ea"/>
-                <a:cs typeface="+mn-cs"/>
-              </a:defRPr>
-            </a:lvl9pPr>
-          </a:lstStyle>
-          <a:p>
-            <a:r>
-              <a:rPr lang="en-US" sz="1600" dirty="0" smtClean="0"/>
-              <a:t>If you finish early:</a:t>
-            </a:r>
-          </a:p>
-          <a:p>
-            <a:pPr lvl="1"/>
-            <a:r>
-              <a:rPr lang="en-US" sz="1400" dirty="0" smtClean="0"/>
-              <a:t>Study the properties of your tree at the depth you decided on </a:t>
-            </a:r>
-          </a:p>
-          <a:p>
-            <a:pPr lvl="2"/>
-            <a:r>
-              <a:rPr lang="en-US" sz="1200" dirty="0" smtClean="0"/>
-              <a:t>Visualize it: </a:t>
-            </a:r>
-            <a:r>
-              <a:rPr lang="en-US" sz="1200" b="0" dirty="0" smtClean="0"/>
-              <a:t>ask me for a code snippet</a:t>
-            </a:r>
-          </a:p>
-          <a:p>
-            <a:pPr lvl="1"/>
-            <a:r>
-              <a:rPr lang="en-US" sz="1400" dirty="0" smtClean="0"/>
-              <a:t>Study the sensitivity to the training test set size, random seed, etc.</a:t>
-            </a:r>
-          </a:p>
-          <a:p>
-            <a:pPr lvl="2"/>
-            <a:r>
-              <a:rPr lang="en-US" sz="1200" dirty="0" smtClean="0">
-                <a:solidFill>
-                  <a:srgbClr val="FF0000"/>
-                </a:solidFill>
-              </a:rPr>
-              <a:t>Test set sensitivity is very important in DT creation!</a:t>
-            </a:r>
-            <a:r>
-              <a:rPr lang="en-US" sz="1200" dirty="0" smtClean="0"/>
-              <a:t> </a:t>
-            </a:r>
-          </a:p>
-          <a:p>
-            <a:pPr lvl="1"/>
-            <a:r>
-              <a:rPr lang="en-US" sz="1400" dirty="0" smtClean="0"/>
-              <a:t>Consider a bootstrap to enable true test MSE estimation</a:t>
-            </a:r>
-          </a:p>
-          <a:p>
-            <a:pPr lvl="1"/>
-            <a:r>
-              <a:rPr lang="en-US" sz="1400" dirty="0" smtClean="0"/>
-              <a:t>Compare error in DT regression to the best fits obtained from MLR, Ridge and LASSO </a:t>
-            </a:r>
-          </a:p>
-          <a:p>
-            <a:pPr lvl="1"/>
-            <a:r>
-              <a:rPr lang="en-US" sz="1400" dirty="0" smtClean="0"/>
-              <a:t>Discuss how you would pick a method to use in the future? </a:t>
-            </a:r>
-          </a:p>
-          <a:p>
-            <a:pPr lvl="1"/>
-            <a:endParaRPr lang="en-US" sz="1400" dirty="0"/>
+              <a:rPr lang="en-US" dirty="0" smtClean="0"/>
+              <a:t>Trees are easy to explain to non-experts</a:t>
+            </a:r>
+          </a:p>
+          <a:p>
+            <a:r>
+              <a:rPr lang="en-US" dirty="0" smtClean="0"/>
+              <a:t>Trees can be displayed graphically (if small)</a:t>
+            </a:r>
+          </a:p>
+          <a:p>
+            <a:r>
+              <a:rPr lang="en-US" dirty="0" smtClean="0"/>
+              <a:t>Trees are highly sensitive to training data</a:t>
+            </a:r>
+          </a:p>
+          <a:p>
+            <a:r>
+              <a:rPr lang="en-US" dirty="0" smtClean="0"/>
+              <a:t>Deep trees are very likely to over fit</a:t>
+            </a:r>
+            <a:endParaRPr lang="en-US" dirty="0"/>
           </a:p>
         </p:txBody>
       </p:sp>
     </p:spTree>
     <p:extLst>
       <p:ext uri="{BB962C8B-B14F-4D97-AF65-F5344CB8AC3E}">
-        <p14:creationId xmlns:p14="http://schemas.microsoft.com/office/powerpoint/2010/main" val="2141526621"/>
+        <p14:creationId xmlns:p14="http://schemas.microsoft.com/office/powerpoint/2010/main" val="546929011"/>
       </p:ext>
     </p:extLst>
   </p:cSld>
@@ -3897,7 +3554,7 @@
           <a:p>
             <a:r>
               <a:rPr lang="en-US" dirty="0" smtClean="0"/>
-              <a:t>Building better trees with ensembles</a:t>
+              <a:t>In class Python project: Teams of 2</a:t>
             </a:r>
             <a:endParaRPr lang="en-US" dirty="0"/>
           </a:p>
@@ -3913,63 +3570,314 @@
             <p:ph type="body" sz="quarter" idx="11"/>
           </p:nvPr>
         </p:nvSpPr>
-        <p:spPr/>
+        <p:spPr>
+          <a:xfrm>
+            <a:off x="671757" y="1539015"/>
+            <a:ext cx="4141295" cy="4932432"/>
+          </a:xfrm>
+        </p:spPr>
         <p:txBody>
           <a:bodyPr/>
           <a:lstStyle/>
           <a:p>
             <a:r>
-              <a:rPr lang="en-US" dirty="0" smtClean="0"/>
-              <a:t>Big picture ensemble concepts</a:t>
-            </a:r>
-          </a:p>
-          <a:p>
-            <a:r>
-              <a:rPr lang="en-US" dirty="0" smtClean="0"/>
-              <a:t>Three common ensemble methods</a:t>
+              <a:rPr lang="en-US" sz="1600" dirty="0" smtClean="0"/>
+              <a:t>You should use the UCI data set and look to predict the Y1 (heating load) response vs all 8 predictors (X1-X8) </a:t>
             </a:r>
           </a:p>
           <a:p>
             <a:pPr lvl="1"/>
             <a:r>
-              <a:rPr lang="en-US" dirty="0" smtClean="0"/>
-              <a:t>Bagging</a:t>
+              <a:rPr lang="en-US" sz="1400" dirty="0" smtClean="0"/>
+              <a:t>Break the data into 80% (training), 20% (testing) </a:t>
+            </a:r>
+          </a:p>
+          <a:p>
+            <a:r>
+              <a:rPr lang="en-US" sz="1600" dirty="0" smtClean="0"/>
+              <a:t>Use a Python package that can perform decision tree regression </a:t>
+            </a:r>
+          </a:p>
+          <a:p>
+            <a:r>
+              <a:rPr lang="en-US" sz="1600" dirty="0" smtClean="0"/>
+              <a:t>Make a plot of testing/training error vs. max tree depth (</a:t>
+            </a:r>
+            <a:r>
+              <a:rPr lang="en-US" sz="1600" b="0" dirty="0" smtClean="0"/>
+              <a:t>discuss what you expect the graph to look like</a:t>
+            </a:r>
+            <a:r>
+              <a:rPr lang="en-US" sz="1600" dirty="0" smtClean="0"/>
+              <a:t> </a:t>
+            </a:r>
+            <a:r>
+              <a:rPr lang="en-US" sz="1600" b="0" dirty="0" smtClean="0"/>
+              <a:t>first!</a:t>
+            </a:r>
+            <a:r>
+              <a:rPr lang="en-US" sz="1600" dirty="0"/>
+              <a:t> </a:t>
+            </a:r>
+            <a:r>
+              <a:rPr lang="en-US" sz="1600" b="0" dirty="0" smtClean="0"/>
+              <a:t>Really.  Draw a sketch!</a:t>
+            </a:r>
+            <a:r>
+              <a:rPr lang="en-US" sz="1600" dirty="0" smtClean="0"/>
+              <a:t>) </a:t>
             </a:r>
           </a:p>
           <a:p>
             <a:pPr lvl="1"/>
             <a:r>
-              <a:rPr lang="en-US" dirty="0" smtClean="0"/>
-              <a:t>Random forests</a:t>
-            </a:r>
-            <a:endParaRPr lang="en-US" dirty="0"/>
+              <a:rPr lang="en-US" sz="1400" dirty="0" smtClean="0"/>
+              <a:t>Don’t worry about differentiating validation vs test set data</a:t>
+            </a:r>
           </a:p>
           <a:p>
             <a:pPr lvl="1"/>
             <a:r>
-              <a:rPr lang="en-US" dirty="0" smtClean="0"/>
-              <a:t>Boosting [</a:t>
-            </a:r>
-            <a:r>
-              <a:rPr lang="en-US" b="0" dirty="0" smtClean="0"/>
-              <a:t>not covered, but similar in qualitative approach</a:t>
-            </a:r>
-            <a:r>
-              <a:rPr lang="en-US" dirty="0" smtClean="0"/>
-              <a:t>]</a:t>
-            </a:r>
-            <a:endParaRPr lang="en-US" dirty="0"/>
+              <a:rPr lang="en-US" sz="1400" dirty="0" smtClean="0"/>
+              <a:t>You can hijack a lot of the code from last Wed </a:t>
+            </a:r>
+          </a:p>
+        </p:txBody>
+      </p:sp>
+      <p:sp>
+        <p:nvSpPr>
+          <p:cNvPr id="4" name="Text Placeholder 2"/>
+          <p:cNvSpPr txBox="1">
+            <a:spLocks/>
+          </p:cNvSpPr>
+          <p:nvPr/>
+        </p:nvSpPr>
+        <p:spPr>
+          <a:xfrm>
+            <a:off x="4715124" y="1355825"/>
+            <a:ext cx="4141295" cy="4932432"/>
+          </a:xfrm>
+          <a:prstGeom prst="rect">
+            <a:avLst/>
+          </a:prstGeom>
+        </p:spPr>
+        <p:txBody>
+          <a:bodyPr/>
+          <a:lstStyle>
+            <a:lvl1pPr marL="342900" indent="-342900" algn="l" defTabSz="457200" rtl="0" eaLnBrk="1" latinLnBrk="0" hangingPunct="1">
+              <a:spcBef>
+                <a:spcPct val="20000"/>
+              </a:spcBef>
+              <a:buFont typeface="Lucida Grande"/>
+              <a:buChar char="&gt;"/>
+              <a:defRPr sz="2400" b="1" i="0" kern="1200" baseline="0">
+                <a:solidFill>
+                  <a:srgbClr val="4B2E83"/>
+                </a:solidFill>
+                <a:latin typeface="Open Sans"/>
+                <a:ea typeface="+mn-ea"/>
+                <a:cs typeface="Open Sans"/>
+              </a:defRPr>
+            </a:lvl1pPr>
+            <a:lvl2pPr marL="742950" indent="-285750" algn="l" defTabSz="457200" rtl="0" eaLnBrk="1" latinLnBrk="0" hangingPunct="1">
+              <a:spcBef>
+                <a:spcPct val="20000"/>
+              </a:spcBef>
+              <a:buFont typeface="Arial"/>
+              <a:buChar char="–"/>
+              <a:defRPr sz="2000" b="1" i="0" kern="1200" baseline="0">
+                <a:solidFill>
+                  <a:srgbClr val="4B2E83"/>
+                </a:solidFill>
+                <a:latin typeface="Open Sans"/>
+                <a:ea typeface="+mn-ea"/>
+                <a:cs typeface="Open Sans"/>
+              </a:defRPr>
+            </a:lvl2pPr>
+            <a:lvl3pPr marL="1143000" indent="-228600" algn="l" defTabSz="457200" rtl="0" eaLnBrk="1" latinLnBrk="0" hangingPunct="1">
+              <a:spcBef>
+                <a:spcPct val="20000"/>
+              </a:spcBef>
+              <a:buSzPct val="100000"/>
+              <a:buFont typeface="Lucida Grande"/>
+              <a:buChar char="&gt;"/>
+              <a:defRPr sz="1800" b="1" i="0" kern="1200" baseline="0">
+                <a:solidFill>
+                  <a:srgbClr val="4B2E83"/>
+                </a:solidFill>
+                <a:latin typeface="Open Sans"/>
+                <a:ea typeface="+mn-ea"/>
+                <a:cs typeface="Open Sans"/>
+              </a:defRPr>
+            </a:lvl3pPr>
+            <a:lvl4pPr marL="1600200" indent="-228600" algn="l" defTabSz="457200" rtl="0" eaLnBrk="1" latinLnBrk="0" hangingPunct="1">
+              <a:spcBef>
+                <a:spcPct val="20000"/>
+              </a:spcBef>
+              <a:buFont typeface="Arial"/>
+              <a:buChar char="–"/>
+              <a:defRPr sz="1600" b="1" i="0" kern="1200" baseline="0">
+                <a:solidFill>
+                  <a:srgbClr val="4B2E83"/>
+                </a:solidFill>
+                <a:latin typeface="Open Sans"/>
+                <a:ea typeface="+mn-ea"/>
+                <a:cs typeface="Open Sans"/>
+              </a:defRPr>
+            </a:lvl4pPr>
+            <a:lvl5pPr marL="2057400" indent="-228600" algn="l" defTabSz="457200" rtl="0" eaLnBrk="1" latinLnBrk="0" hangingPunct="1">
+              <a:spcBef>
+                <a:spcPct val="20000"/>
+              </a:spcBef>
+              <a:buFont typeface="Lucida Grande"/>
+              <a:buChar char="&gt;"/>
+              <a:defRPr sz="1400" b="1" i="0" kern="1200" baseline="0">
+                <a:solidFill>
+                  <a:srgbClr val="4B2E83"/>
+                </a:solidFill>
+                <a:latin typeface="Open Sans"/>
+                <a:ea typeface="+mn-ea"/>
+                <a:cs typeface="Open Sans"/>
+              </a:defRPr>
+            </a:lvl5pPr>
+            <a:lvl6pPr marL="2514600" indent="-228600" algn="l" defTabSz="457200" rtl="0" eaLnBrk="1" latinLnBrk="0" hangingPunct="1">
+              <a:spcBef>
+                <a:spcPct val="20000"/>
+              </a:spcBef>
+              <a:buFont typeface="Arial"/>
+              <a:buChar char="•"/>
+              <a:defRPr sz="2000" kern="1200">
+                <a:solidFill>
+                  <a:schemeClr val="tx1"/>
+                </a:solidFill>
+                <a:latin typeface="+mn-lt"/>
+                <a:ea typeface="+mn-ea"/>
+                <a:cs typeface="+mn-cs"/>
+              </a:defRPr>
+            </a:lvl6pPr>
+            <a:lvl7pPr marL="2971800" indent="-228600" algn="l" defTabSz="457200" rtl="0" eaLnBrk="1" latinLnBrk="0" hangingPunct="1">
+              <a:spcBef>
+                <a:spcPct val="20000"/>
+              </a:spcBef>
+              <a:buFont typeface="Arial"/>
+              <a:buChar char="•"/>
+              <a:defRPr sz="2000" kern="1200">
+                <a:solidFill>
+                  <a:schemeClr val="tx1"/>
+                </a:solidFill>
+                <a:latin typeface="+mn-lt"/>
+                <a:ea typeface="+mn-ea"/>
+                <a:cs typeface="+mn-cs"/>
+              </a:defRPr>
+            </a:lvl7pPr>
+            <a:lvl8pPr marL="3429000" indent="-228600" algn="l" defTabSz="457200" rtl="0" eaLnBrk="1" latinLnBrk="0" hangingPunct="1">
+              <a:spcBef>
+                <a:spcPct val="20000"/>
+              </a:spcBef>
+              <a:buFont typeface="Arial"/>
+              <a:buChar char="•"/>
+              <a:defRPr sz="2000" kern="1200">
+                <a:solidFill>
+                  <a:schemeClr val="tx1"/>
+                </a:solidFill>
+                <a:latin typeface="+mn-lt"/>
+                <a:ea typeface="+mn-ea"/>
+                <a:cs typeface="+mn-cs"/>
+              </a:defRPr>
+            </a:lvl8pPr>
+            <a:lvl9pPr marL="3886200" indent="-228600" algn="l" defTabSz="457200" rtl="0" eaLnBrk="1" latinLnBrk="0" hangingPunct="1">
+              <a:spcBef>
+                <a:spcPct val="20000"/>
+              </a:spcBef>
+              <a:buFont typeface="Arial"/>
+              <a:buChar char="•"/>
+              <a:defRPr sz="2000" kern="1200">
+                <a:solidFill>
+                  <a:schemeClr val="tx1"/>
+                </a:solidFill>
+                <a:latin typeface="+mn-lt"/>
+                <a:ea typeface="+mn-ea"/>
+                <a:cs typeface="+mn-cs"/>
+              </a:defRPr>
+            </a:lvl9pPr>
+          </a:lstStyle>
+          <a:p>
+            <a:r>
+              <a:rPr lang="en-US" sz="1600" dirty="0" smtClean="0"/>
+              <a:t>If you finish early:</a:t>
+            </a:r>
           </a:p>
           <a:p>
             <a:pPr lvl="1"/>
-            <a:endParaRPr lang="en-US" dirty="0"/>
+            <a:r>
+              <a:rPr lang="en-US" sz="1400" dirty="0" smtClean="0"/>
+              <a:t>Study the properties of your tree at the depth you decided on </a:t>
+            </a:r>
+          </a:p>
+          <a:p>
+            <a:pPr lvl="2"/>
+            <a:r>
+              <a:rPr lang="en-US" sz="1200" dirty="0" smtClean="0"/>
+              <a:t>Visualize it: </a:t>
+            </a:r>
+            <a:r>
+              <a:rPr lang="en-US" sz="1200" b="0" dirty="0" smtClean="0"/>
+              <a:t>ask me for a code snippet</a:t>
+            </a:r>
+          </a:p>
+          <a:p>
+            <a:pPr lvl="1"/>
+            <a:r>
+              <a:rPr lang="en-US" sz="1400" dirty="0" smtClean="0"/>
+              <a:t>Study the sensitivity to the training test set size, random seed, etc.</a:t>
+            </a:r>
+          </a:p>
+          <a:p>
+            <a:pPr lvl="2"/>
+            <a:r>
+              <a:rPr lang="en-US" sz="1200" dirty="0" smtClean="0">
+                <a:solidFill>
+                  <a:srgbClr val="FF0000"/>
+                </a:solidFill>
+              </a:rPr>
+              <a:t>Test set sensitivity is very important in DT creation!</a:t>
+            </a:r>
+            <a:r>
+              <a:rPr lang="en-US" sz="1200" dirty="0" smtClean="0"/>
+              <a:t> </a:t>
+            </a:r>
+          </a:p>
+          <a:p>
+            <a:pPr lvl="1"/>
+            <a:r>
+              <a:rPr lang="en-US" sz="1400" dirty="0" smtClean="0"/>
+              <a:t>Consider a bootstrap to enable true test MSE estimation</a:t>
+            </a:r>
+          </a:p>
+          <a:p>
+            <a:pPr lvl="1"/>
+            <a:r>
+              <a:rPr lang="en-US" sz="1400" dirty="0" smtClean="0"/>
+              <a:t>Compare error in DT regression to the best fits obtained from MLR, Ridge and LASSO </a:t>
+            </a:r>
+          </a:p>
+          <a:p>
+            <a:pPr lvl="1"/>
+            <a:r>
+              <a:rPr lang="en-US" sz="1400" dirty="0" smtClean="0"/>
+              <a:t>Discuss how you would pick a method to use in the future? </a:t>
+            </a:r>
+          </a:p>
+          <a:p>
+            <a:pPr lvl="1"/>
+            <a:endParaRPr lang="en-US" sz="1400" dirty="0"/>
           </a:p>
         </p:txBody>
       </p:sp>
     </p:spTree>
     <p:extLst>
       <p:ext uri="{BB962C8B-B14F-4D97-AF65-F5344CB8AC3E}">
-        <p14:creationId xmlns:p14="http://schemas.microsoft.com/office/powerpoint/2010/main" val="854565407"/>
+        <p14:creationId xmlns:p14="http://schemas.microsoft.com/office/powerpoint/2010/main" val="2141526621"/>
       </p:ext>
     </p:extLst>
   </p:cSld>
@@ -4013,6 +3921,122 @@
           <a:p>
             <a:r>
               <a:rPr lang="en-US" dirty="0" smtClean="0"/>
+              <a:t>Building better trees with ensembles</a:t>
+            </a:r>
+            <a:endParaRPr lang="en-US" dirty="0"/>
+          </a:p>
+        </p:txBody>
+      </p:sp>
+      <p:sp>
+        <p:nvSpPr>
+          <p:cNvPr id="3" name="Text Placeholder 2"/>
+          <p:cNvSpPr>
+            <a:spLocks noGrp="1"/>
+          </p:cNvSpPr>
+          <p:nvPr>
+            <p:ph type="body" sz="quarter" idx="11"/>
+          </p:nvPr>
+        </p:nvSpPr>
+        <p:spPr/>
+        <p:txBody>
+          <a:bodyPr/>
+          <a:lstStyle/>
+          <a:p>
+            <a:r>
+              <a:rPr lang="en-US" dirty="0" smtClean="0"/>
+              <a:t>Big picture ensemble concepts</a:t>
+            </a:r>
+          </a:p>
+          <a:p>
+            <a:r>
+              <a:rPr lang="en-US" dirty="0" smtClean="0"/>
+              <a:t>Three common ensemble methods</a:t>
+            </a:r>
+          </a:p>
+          <a:p>
+            <a:pPr lvl="1"/>
+            <a:r>
+              <a:rPr lang="en-US" dirty="0" smtClean="0"/>
+              <a:t>Bagging</a:t>
+            </a:r>
+          </a:p>
+          <a:p>
+            <a:pPr lvl="1"/>
+            <a:r>
+              <a:rPr lang="en-US" dirty="0" smtClean="0"/>
+              <a:t>Random forests</a:t>
+            </a:r>
+            <a:endParaRPr lang="en-US" dirty="0"/>
+          </a:p>
+          <a:p>
+            <a:pPr lvl="1"/>
+            <a:r>
+              <a:rPr lang="en-US" dirty="0" smtClean="0"/>
+              <a:t>Boosting [</a:t>
+            </a:r>
+            <a:r>
+              <a:rPr lang="en-US" b="0" dirty="0" smtClean="0"/>
+              <a:t>not covered, but similar in qualitative approach</a:t>
+            </a:r>
+            <a:r>
+              <a:rPr lang="en-US" dirty="0" smtClean="0"/>
+              <a:t>]</a:t>
+            </a:r>
+            <a:endParaRPr lang="en-US" dirty="0"/>
+          </a:p>
+          <a:p>
+            <a:pPr lvl="1"/>
+            <a:endParaRPr lang="en-US" dirty="0"/>
+          </a:p>
+        </p:txBody>
+      </p:sp>
+    </p:spTree>
+    <p:extLst>
+      <p:ext uri="{BB962C8B-B14F-4D97-AF65-F5344CB8AC3E}">
+        <p14:creationId xmlns:p14="http://schemas.microsoft.com/office/powerpoint/2010/main" val="854565407"/>
+      </p:ext>
+    </p:extLst>
+  </p:cSld>
+  <p:clrMapOvr>
+    <a:masterClrMapping/>
+  </p:clrMapOvr>
+</p:sld>
+</file>
+
+<file path=ppt/slides/slide13.xml><?xml version="1.0" encoding="utf-8"?>
+<p:sld xmlns:a="http://schemas.openxmlformats.org/drawingml/2006/main" xmlns:r="http://schemas.openxmlformats.org/officeDocument/2006/relationships" xmlns:p="http://schemas.openxmlformats.org/presentationml/2006/main">
+  <p:cSld>
+    <p:spTree>
+      <p:nvGrpSpPr>
+        <p:cNvPr id="1" name=""/>
+        <p:cNvGrpSpPr/>
+        <p:nvPr/>
+      </p:nvGrpSpPr>
+      <p:grpSpPr>
+        <a:xfrm>
+          <a:off x="0" y="0"/>
+          <a:ext cx="0" cy="0"/>
+          <a:chOff x="0" y="0"/>
+          <a:chExt cx="0" cy="0"/>
+        </a:xfrm>
+      </p:grpSpPr>
+      <p:sp>
+        <p:nvSpPr>
+          <p:cNvPr id="2" name="Text Placeholder 1"/>
+          <p:cNvSpPr>
+            <a:spLocks noGrp="1"/>
+          </p:cNvSpPr>
+          <p:nvPr>
+            <p:ph type="body" sz="quarter" idx="10"/>
+          </p:nvPr>
+        </p:nvSpPr>
+        <p:spPr/>
+        <p:txBody>
+          <a:bodyPr/>
+          <a:lstStyle/>
+          <a:p>
+            <a:r>
+              <a:rPr lang="en-US" dirty="0" smtClean="0"/>
               <a:t>Ensemble methods (general)</a:t>
             </a:r>
             <a:endParaRPr lang="en-US" dirty="0"/>
@@ -4041,7 +4065,11 @@
           <a:p>
             <a:r>
               <a:rPr lang="en-US" sz="2000" dirty="0" smtClean="0"/>
-              <a:t>A major takeaway from ISL CH8 is that the error of a DT is highly dependent on the training set used </a:t>
+              <a:t>The </a:t>
+            </a:r>
+            <a:r>
+              <a:rPr lang="en-US" sz="2000" dirty="0" smtClean="0"/>
+              <a:t>error of a DT is highly dependent on the training set used </a:t>
             </a:r>
             <a:r>
               <a:rPr lang="mr-IN" sz="2000" dirty="0" smtClean="0"/>
@@ -4122,7 +4150,7 @@
 </p:sld>
 </file>
 
-<file path=ppt/slides/slide13.xml><?xml version="1.0" encoding="utf-8"?>
+<file path=ppt/slides/slide14.xml><?xml version="1.0" encoding="utf-8"?>
 <p:sld xmlns:a="http://schemas.openxmlformats.org/drawingml/2006/main" xmlns:r="http://schemas.openxmlformats.org/officeDocument/2006/relationships" xmlns:p="http://schemas.openxmlformats.org/presentationml/2006/main">
   <p:cSld>
     <p:spTree>
@@ -4320,7 +4348,7 @@
 </p:sld>
 </file>
 
-<file path=ppt/slides/slide14.xml><?xml version="1.0" encoding="utf-8"?>
+<file path=ppt/slides/slide15.xml><?xml version="1.0" encoding="utf-8"?>
 <p:sld xmlns:a="http://schemas.openxmlformats.org/drawingml/2006/main" xmlns:r="http://schemas.openxmlformats.org/officeDocument/2006/relationships" xmlns:p="http://schemas.openxmlformats.org/presentationml/2006/main">
   <p:cSld>
     <p:spTree>
@@ -4385,8 +4413,20 @@
             </a:r>
             <a:r>
               <a:rPr lang="en-US" dirty="0" smtClean="0"/>
-              <a:t>, leading to increased training set error</a:t>
-            </a:r>
+              <a:t>, leading to increased training set </a:t>
+            </a:r>
+            <a:r>
+              <a:rPr lang="en-US" dirty="0" smtClean="0"/>
+              <a:t>error</a:t>
+            </a:r>
+          </a:p>
+          <a:p>
+            <a:pPr lvl="1"/>
+            <a:r>
+              <a:rPr lang="en-US" dirty="0" smtClean="0"/>
+              <a:t>Predictors with a lot of information gain will be at the top of most bagged trees, making them less independent</a:t>
+            </a:r>
+            <a:endParaRPr lang="en-US" dirty="0" smtClean="0"/>
           </a:p>
           <a:p>
             <a:r>
@@ -4395,7 +4435,15 @@
             </a:r>
             <a:r>
               <a:rPr lang="en-US" b="0" dirty="0" smtClean="0"/>
-              <a:t>random sample of predictors</a:t>
+              <a:t>random </a:t>
+            </a:r>
+            <a:r>
+              <a:rPr lang="en-US" b="0" dirty="0" smtClean="0"/>
+              <a:t>subset of </a:t>
+            </a:r>
+            <a:r>
+              <a:rPr lang="en-US" b="0" dirty="0" smtClean="0"/>
+              <a:t>predictors</a:t>
             </a:r>
             <a:r>
               <a:rPr lang="en-US" dirty="0" smtClean="0"/>
@@ -4412,11 +4460,21 @@
               <a:rPr lang="en-US" i="1" dirty="0" smtClean="0">
                 <a:latin typeface="times new roman" charset="0"/>
               </a:rPr>
-              <a:t>m ~= p^0.5 </a:t>
-            </a:r>
-            <a:r>
-              <a:rPr lang="en-US" dirty="0" smtClean="0"/>
-              <a:t>predictors are randomly chosen at each split </a:t>
+              <a:t>m ~= </a:t>
+            </a:r>
+            <a:r>
+              <a:rPr lang="en-US" i="1" dirty="0" smtClean="0">
+                <a:latin typeface="times new roman" charset="0"/>
+              </a:rPr>
+              <a:t>√p </a:t>
+            </a:r>
+            <a:r>
+              <a:rPr lang="en-US" dirty="0" smtClean="0"/>
+              <a:t>predictors are randomly chosen at each </a:t>
+            </a:r>
+            <a:r>
+              <a:rPr lang="en-US" dirty="0" smtClean="0"/>
+              <a:t>split, other predictors are ignored</a:t>
             </a:r>
             <a:endParaRPr lang="en-US" dirty="0"/>
           </a:p>
@@ -4447,7 +4505,7 @@
 </p:sld>
 </file>
 
-<file path=ppt/slides/slide15.xml><?xml version="1.0" encoding="utf-8"?>
+<file path=ppt/slides/slide16.xml><?xml version="1.0" encoding="utf-8"?>
 <p:sld xmlns:a="http://schemas.openxmlformats.org/drawingml/2006/main" xmlns:r="http://schemas.openxmlformats.org/officeDocument/2006/relationships" xmlns:p="http://schemas.openxmlformats.org/presentationml/2006/main">
   <p:cSld>
     <p:spTree>
@@ -4634,13 +4692,8 @@
             <a:pPr lvl="1"/>
             <a:r>
               <a:rPr lang="en-US" dirty="0" smtClean="0"/>
-              <a:t>Definition and </a:t>
-            </a:r>
-            <a:r>
-              <a:rPr lang="en-US" dirty="0" smtClean="0"/>
-              <a:t>properties</a:t>
-            </a:r>
-            <a:endParaRPr lang="en-US" dirty="0" smtClean="0"/>
+              <a:t>Definition and properties</a:t>
+            </a:r>
           </a:p>
           <a:p>
             <a:pPr lvl="1"/>
@@ -4665,16 +4718,11 @@
               <a:rPr lang="en-US" dirty="0" smtClean="0"/>
               <a:t>project</a:t>
             </a:r>
-            <a:endParaRPr lang="en-US" dirty="0" smtClean="0"/>
-          </a:p>
-          <a:p>
-            <a:r>
-              <a:rPr lang="en-US" dirty="0" smtClean="0"/>
-              <a:t>Methods </a:t>
-            </a:r>
-            <a:r>
-              <a:rPr lang="en-US" dirty="0" smtClean="0"/>
-              <a:t>to improve decision trees </a:t>
+          </a:p>
+          <a:p>
+            <a:r>
+              <a:rPr lang="en-US" dirty="0" smtClean="0"/>
+              <a:t>Methods to improve decision trees </a:t>
             </a:r>
           </a:p>
           <a:p>
@@ -4683,23 +4731,17 @@
               <a:rPr lang="en-US" dirty="0" smtClean="0"/>
               <a:t>Bagging, boosting, random forests </a:t>
             </a:r>
-            <a:endParaRPr lang="en-US" dirty="0" smtClean="0"/>
           </a:p>
           <a:p>
             <a:r>
               <a:rPr lang="en-US" dirty="0" smtClean="0"/>
               <a:t>Python example</a:t>
             </a:r>
-            <a:endParaRPr lang="en-US" dirty="0" smtClean="0"/>
-          </a:p>
-          <a:p>
-            <a:r>
-              <a:rPr lang="en-US" dirty="0" smtClean="0"/>
-              <a:t>Wrap </a:t>
-            </a:r>
-            <a:r>
-              <a:rPr lang="en-US" dirty="0" smtClean="0"/>
-              <a:t>up</a:t>
+          </a:p>
+          <a:p>
+            <a:r>
+              <a:rPr lang="en-US" dirty="0" smtClean="0"/>
+              <a:t>Wrap up</a:t>
             </a:r>
           </a:p>
         </p:txBody>
@@ -4787,23 +4829,14 @@
           <a:p>
             <a:r>
               <a:rPr lang="en-US" dirty="0" smtClean="0"/>
-              <a:t>Subset </a:t>
-            </a:r>
-            <a:r>
-              <a:rPr lang="en-US" dirty="0" smtClean="0"/>
-              <a:t>selection</a:t>
-            </a:r>
-          </a:p>
-          <a:p>
-            <a:r>
-              <a:rPr lang="en-US" dirty="0" smtClean="0"/>
-              <a:t>Shrinkage/regularization methods</a:t>
-            </a:r>
-            <a:r>
-              <a:rPr lang="en-US" dirty="0" smtClean="0"/>
-              <a:t> </a:t>
-            </a:r>
-            <a:endParaRPr lang="en-US" dirty="0" smtClean="0"/>
+              <a:t>Subset selection</a:t>
+            </a:r>
+          </a:p>
+          <a:p>
+            <a:r>
+              <a:rPr lang="en-US" dirty="0" smtClean="0"/>
+              <a:t>Shrinkage/regularization methods </a:t>
+            </a:r>
           </a:p>
           <a:p>
             <a:pPr lvl="1"/>
@@ -4873,7 +4906,6 @@
               <a:rPr lang="en-US" dirty="0" smtClean="0"/>
               <a:t>Subset selection algorithms help determine a smaller set of X’s that explain more of the variance in Y </a:t>
             </a:r>
-            <a:endParaRPr lang="en-US" dirty="0" smtClean="0"/>
           </a:p>
           <a:p>
             <a:pPr marL="285750" indent="-285750">
@@ -6179,56 +6211,13 @@
             </a:r>
             <a:r>
               <a:rPr lang="en-US" dirty="0" smtClean="0"/>
-              <a:t>” and comparisons</a:t>
-            </a:r>
-          </a:p>
-          <a:p>
-            <a:r>
-              <a:rPr lang="en-US" dirty="0" smtClean="0"/>
-              <a:t>Main advantage is ability to </a:t>
-            </a:r>
-          </a:p>
-          <a:p>
-            <a:pPr marL="0" indent="0">
-              <a:buNone/>
-            </a:pPr>
-            <a:r>
-              <a:rPr lang="en-US" dirty="0"/>
-              <a:t> </a:t>
-            </a:r>
-            <a:r>
-              <a:rPr lang="en-US" dirty="0" smtClean="0"/>
-              <a:t>   handle nonlinear relationships</a:t>
-            </a:r>
-          </a:p>
-          <a:p>
-            <a:r>
-              <a:rPr lang="en-US" dirty="0" smtClean="0"/>
-              <a:t>Main disadvantage is high </a:t>
-            </a:r>
-          </a:p>
-          <a:p>
-            <a:pPr marL="0" indent="0">
-              <a:buNone/>
-            </a:pPr>
-            <a:r>
-              <a:rPr lang="en-US" dirty="0" smtClean="0"/>
-              <a:t>    sensitivity to changes in test </a:t>
-            </a:r>
-          </a:p>
-          <a:p>
-            <a:pPr marL="0" indent="0">
-              <a:buNone/>
-            </a:pPr>
-            <a:r>
-              <a:rPr lang="en-US" dirty="0"/>
-              <a:t> </a:t>
-            </a:r>
-            <a:r>
-              <a:rPr lang="en-US" dirty="0" smtClean="0"/>
-              <a:t>   set </a:t>
-            </a:r>
-            <a:endParaRPr lang="en-US" dirty="0"/>
+              <a:t>” and </a:t>
+            </a:r>
+            <a:r>
+              <a:rPr lang="en-US" dirty="0" smtClean="0"/>
+              <a:t>comparisons</a:t>
+            </a:r>
+            <a:endParaRPr lang="en-US" dirty="0" smtClean="0"/>
           </a:p>
         </p:txBody>
       </p:sp>

</xml_diff>